<commit_message>
included context based image retrieval
</commit_message>
<xml_diff>
--- a/output.pptx
+++ b/output.pptx
@@ -11,6 +11,9 @@
     <p:sldId id="259" r:id="rId10"/>
     <p:sldId id="260" r:id="rId11"/>
     <p:sldId id="261" r:id="rId12"/>
+    <p:sldId id="262" r:id="rId13"/>
+    <p:sldId id="263" r:id="rId14"/>
+    <p:sldId id="264" r:id="rId15"/>
   </p:sldIdLst>
   <p:sldSz cx="9144000" cy="6858000" type="screen4x3"/>
   <p:notesSz cx="6858000" cy="9144000"/>
@@ -3109,7 +3112,7 @@
           <a:lstStyle/>
           <a:p>
             <a:r>
-              <a:t>Sample Report Summary</a:t>
+              <a:t>My Deck</a:t>
             </a:r>
           </a:p>
         </p:txBody>
@@ -3155,70 +3158,66 @@
       <p:grpSpPr/>
       <p:sp>
         <p:nvSpPr>
-          <p:cNvPr id="2" name="Title 1"/>
-          <p:cNvSpPr>
-            <a:spLocks noGrp="1"/>
-          </p:cNvSpPr>
-          <p:nvPr>
-            <p:ph type="title"/>
-          </p:nvPr>
-        </p:nvSpPr>
-        <p:spPr/>
-        <p:txBody>
-          <a:bodyPr/>
-          <a:lstStyle/>
-          <a:p>
-            <a:r>
-              <a:t>Overview</a:t>
-            </a:r>
-          </a:p>
-        </p:txBody>
-      </p:sp>
-      <p:sp>
-        <p:nvSpPr>
-          <p:cNvPr id="3" name="Content Placeholder 2"/>
-          <p:cNvSpPr>
-            <a:spLocks noGrp="1"/>
-          </p:cNvSpPr>
-          <p:nvPr>
-            <p:ph idx="1"/>
-          </p:nvPr>
-        </p:nvSpPr>
-        <p:spPr/>
-        <p:txBody>
-          <a:bodyPr/>
-          <a:lstStyle/>
-          <a:p>
-            <a:r>
-              <a:t>This presentation covers insights from the uploaded document.</a:t>
-            </a:r>
-          </a:p>
-        </p:txBody>
-      </p:sp>
-      <p:pic>
-        <p:nvPicPr>
-          <p:cNvPr id="4" name="Picture 3" descr="page18_img1.png"/>
-          <p:cNvPicPr>
-            <a:picLocks noChangeAspect="1"/>
-          </p:cNvPicPr>
+          <p:cNvPr id="2" name="TextBox 1"/>
+          <p:cNvSpPr txBox="1"/>
           <p:nvPr/>
-        </p:nvPicPr>
-        <p:blipFill>
-          <a:blip r:embed="rId2"/>
-          <a:stretch>
-            <a:fillRect/>
-          </a:stretch>
-        </p:blipFill>
+        </p:nvSpPr>
         <p:spPr>
           <a:xfrm>
-            <a:off x="5029200" y="1371600"/>
-            <a:ext cx="5662246" cy="3200400"/>
+            <a:off x="457200" y="182880"/>
+            <a:ext cx="8229600" cy="914400"/>
           </a:xfrm>
           <a:prstGeom prst="rect">
             <a:avLst/>
           </a:prstGeom>
+          <a:noFill/>
         </p:spPr>
-      </p:pic>
+        <p:txBody>
+          <a:bodyPr wrap="none">
+            <a:spAutoFit/>
+          </a:bodyPr>
+          <a:lstStyle/>
+          <a:p>
+            <a:r>
+              <a:t>Introduction</a:t>
+            </a:r>
+          </a:p>
+        </p:txBody>
+      </p:sp>
+      <p:sp>
+        <p:nvSpPr>
+          <p:cNvPr id="3" name="TextBox 2"/>
+          <p:cNvSpPr txBox="1"/>
+          <p:nvPr/>
+        </p:nvSpPr>
+        <p:spPr>
+          <a:xfrm>
+            <a:off x="1828800" y="2286000"/>
+            <a:ext cx="5486400" cy="2286000"/>
+          </a:xfrm>
+          <a:prstGeom prst="rect">
+            <a:avLst/>
+          </a:prstGeom>
+          <a:noFill/>
+        </p:spPr>
+        <p:txBody>
+          <a:bodyPr wrap="square">
+            <a:noAutofit/>
+          </a:bodyPr>
+          <a:lstStyle/>
+          <a:p>
+            <a:r>
+              <a:rPr sz="1800" b="0" i="0">
+                <a:latin typeface="Calibri"/>
+              </a:rPr>
+              <a:t>Be a Food Hero. Cook together. Eat together. Talk together.</a:t>
+            </a:r>
+            <a:endParaRPr sz="1800" b="0" i="0">
+              <a:latin typeface="Calibri"/>
+            </a:endParaRPr>
+          </a:p>
+        </p:txBody>
+      </p:sp>
     </p:spTree>
   </p:cSld>
   <p:clrMapOvr>
@@ -3239,80 +3238,66 @@
       <p:grpSpPr/>
       <p:sp>
         <p:nvSpPr>
-          <p:cNvPr id="2" name="Title 1"/>
-          <p:cNvSpPr>
-            <a:spLocks noGrp="1"/>
-          </p:cNvSpPr>
-          <p:nvPr>
-            <p:ph type="title"/>
-          </p:nvPr>
-        </p:nvSpPr>
-        <p:spPr/>
-        <p:txBody>
-          <a:bodyPr/>
-          <a:lstStyle/>
-          <a:p>
-            <a:r>
-              <a:t>Key Takeaways</a:t>
-            </a:r>
-          </a:p>
-        </p:txBody>
-      </p:sp>
-      <p:sp>
-        <p:nvSpPr>
-          <p:cNvPr id="3" name="Content Placeholder 2"/>
-          <p:cNvSpPr>
-            <a:spLocks noGrp="1"/>
-          </p:cNvSpPr>
-          <p:nvPr>
-            <p:ph idx="1"/>
-          </p:nvPr>
-        </p:nvSpPr>
-        <p:spPr/>
-        <p:txBody>
-          <a:bodyPr/>
-          <a:lstStyle/>
-          <a:p>
-            <a:r>
-              <a:t>1. Point one</a:t>
-            </a:r>
-          </a:p>
-          <a:p>
-            <a:r>
-              <a:t>2. Point two</a:t>
-            </a:r>
-          </a:p>
-          <a:p>
-            <a:r>
-              <a:t>3. Point three</a:t>
-            </a:r>
-          </a:p>
-        </p:txBody>
-      </p:sp>
-      <p:pic>
-        <p:nvPicPr>
-          <p:cNvPr id="4" name="Picture 3" descr="page2_img1.png"/>
-          <p:cNvPicPr>
-            <a:picLocks noChangeAspect="1"/>
-          </p:cNvPicPr>
+          <p:cNvPr id="2" name="TextBox 1"/>
+          <p:cNvSpPr txBox="1"/>
           <p:nvPr/>
-        </p:nvPicPr>
-        <p:blipFill>
-          <a:blip r:embed="rId2"/>
-          <a:stretch>
-            <a:fillRect/>
-          </a:stretch>
-        </p:blipFill>
+        </p:nvSpPr>
         <p:spPr>
           <a:xfrm>
-            <a:off x="5029200" y="1371600"/>
-            <a:ext cx="9930008" cy="3200400"/>
+            <a:off x="457200" y="182880"/>
+            <a:ext cx="8229600" cy="914400"/>
           </a:xfrm>
           <a:prstGeom prst="rect">
             <a:avLst/>
           </a:prstGeom>
+          <a:noFill/>
         </p:spPr>
-      </p:pic>
+        <p:txBody>
+          <a:bodyPr wrap="none">
+            <a:spAutoFit/>
+          </a:bodyPr>
+          <a:lstStyle/>
+          <a:p>
+            <a:r>
+              <a:t>Table of Contents</a:t>
+            </a:r>
+          </a:p>
+        </p:txBody>
+      </p:sp>
+      <p:sp>
+        <p:nvSpPr>
+          <p:cNvPr id="3" name="TextBox 2"/>
+          <p:cNvSpPr txBox="1"/>
+          <p:nvPr/>
+        </p:nvSpPr>
+        <p:spPr>
+          <a:xfrm>
+            <a:off x="1828800" y="2286000"/>
+            <a:ext cx="5486400" cy="2286000"/>
+          </a:xfrm>
+          <a:prstGeom prst="rect">
+            <a:avLst/>
+          </a:prstGeom>
+          <a:noFill/>
+        </p:spPr>
+        <p:txBody>
+          <a:bodyPr wrap="square">
+            <a:noAutofit/>
+          </a:bodyPr>
+          <a:lstStyle/>
+          <a:p>
+            <a:r>
+              <a:rPr sz="1800" b="0" i="0">
+                <a:latin typeface="Calibri"/>
+              </a:rPr>
+              <a:t>Overview of recipes and tips included in this book.</a:t>
+            </a:r>
+            <a:endParaRPr sz="1800" b="0" i="0">
+              <a:latin typeface="Calibri"/>
+            </a:endParaRPr>
+          </a:p>
+        </p:txBody>
+      </p:sp>
     </p:spTree>
   </p:cSld>
   <p:clrMapOvr>
@@ -3333,70 +3318,66 @@
       <p:grpSpPr/>
       <p:sp>
         <p:nvSpPr>
-          <p:cNvPr id="2" name="Title 1"/>
-          <p:cNvSpPr>
-            <a:spLocks noGrp="1"/>
-          </p:cNvSpPr>
-          <p:nvPr>
-            <p:ph type="title"/>
-          </p:nvPr>
-        </p:nvSpPr>
-        <p:spPr/>
-        <p:txBody>
-          <a:bodyPr/>
-          <a:lstStyle/>
-          <a:p>
-            <a:r>
-              <a:t>Conclusion</a:t>
-            </a:r>
-          </a:p>
-        </p:txBody>
-      </p:sp>
-      <p:sp>
-        <p:nvSpPr>
-          <p:cNvPr id="3" name="Content Placeholder 2"/>
-          <p:cNvSpPr>
-            <a:spLocks noGrp="1"/>
-          </p:cNvSpPr>
-          <p:nvPr>
-            <p:ph idx="1"/>
-          </p:nvPr>
-        </p:nvSpPr>
-        <p:spPr/>
-        <p:txBody>
-          <a:bodyPr/>
-          <a:lstStyle/>
-          <a:p>
-            <a:r>
-              <a:t>The document highlights several important trends...</a:t>
-            </a:r>
-          </a:p>
-        </p:txBody>
-      </p:sp>
-      <p:pic>
-        <p:nvPicPr>
-          <p:cNvPr id="4" name="Picture 3" descr="page4_img1.png"/>
-          <p:cNvPicPr>
-            <a:picLocks noChangeAspect="1"/>
-          </p:cNvPicPr>
+          <p:cNvPr id="2" name="TextBox 1"/>
+          <p:cNvSpPr txBox="1"/>
           <p:nvPr/>
-        </p:nvPicPr>
-        <p:blipFill>
-          <a:blip r:embed="rId2"/>
-          <a:stretch>
-            <a:fillRect/>
-          </a:stretch>
-        </p:blipFill>
+        </p:nvSpPr>
         <p:spPr>
           <a:xfrm>
-            <a:off x="5029200" y="1371600"/>
-            <a:ext cx="3030047" cy="3200400"/>
+            <a:off x="457200" y="182880"/>
+            <a:ext cx="8229600" cy="914400"/>
           </a:xfrm>
           <a:prstGeom prst="rect">
             <a:avLst/>
           </a:prstGeom>
+          <a:noFill/>
         </p:spPr>
-      </p:pic>
+        <p:txBody>
+          <a:bodyPr wrap="none">
+            <a:spAutoFit/>
+          </a:bodyPr>
+          <a:lstStyle/>
+          <a:p>
+            <a:r>
+              <a:t>All About the Recipes</a:t>
+            </a:r>
+          </a:p>
+        </p:txBody>
+      </p:sp>
+      <p:sp>
+        <p:nvSpPr>
+          <p:cNvPr id="3" name="TextBox 2"/>
+          <p:cNvSpPr txBox="1"/>
+          <p:nvPr/>
+        </p:nvSpPr>
+        <p:spPr>
+          <a:xfrm>
+            <a:off x="457200" y="1828800"/>
+            <a:ext cx="5486400" cy="2286000"/>
+          </a:xfrm>
+          <a:prstGeom prst="rect">
+            <a:avLst/>
+          </a:prstGeom>
+          <a:noFill/>
+        </p:spPr>
+        <p:txBody>
+          <a:bodyPr wrap="square">
+            <a:noAutofit/>
+          </a:bodyPr>
+          <a:lstStyle/>
+          <a:p>
+            <a:r>
+              <a:rPr sz="1800" b="0" i="0">
+                <a:latin typeface="Calibri"/>
+              </a:rPr>
+              <a:t>Recipes in this book are easy to make with common ingredients and basic tools. Customize each recipe to your liking.</a:t>
+            </a:r>
+            <a:endParaRPr sz="1800" b="0" i="0">
+              <a:latin typeface="Calibri"/>
+            </a:endParaRPr>
+          </a:p>
+        </p:txBody>
+      </p:sp>
     </p:spTree>
   </p:cSld>
   <p:clrMapOvr>
@@ -3417,348 +3398,66 @@
       <p:grpSpPr/>
       <p:sp>
         <p:nvSpPr>
-          <p:cNvPr id="2" name="Title 1"/>
-          <p:cNvSpPr>
-            <a:spLocks noGrp="1"/>
-          </p:cNvSpPr>
-          <p:nvPr>
-            <p:ph type="title"/>
-          </p:nvPr>
-        </p:nvSpPr>
-        <p:spPr/>
-        <p:txBody>
-          <a:bodyPr/>
-          <a:lstStyle/>
-          <a:p>
-            <a:r>
-              <a:t>Table 1</a:t>
-            </a:r>
-          </a:p>
-        </p:txBody>
-      </p:sp>
-      <p:graphicFrame>
-        <p:nvGraphicFramePr>
-          <p:cNvPr id="3" name="Table 2"/>
-          <p:cNvGraphicFramePr>
-            <a:graphicFrameLocks noGrp="1"/>
-          </p:cNvGraphicFramePr>
+          <p:cNvPr id="2" name="TextBox 1"/>
+          <p:cNvSpPr txBox="1"/>
           <p:nvPr/>
-        </p:nvGraphicFramePr>
-        <p:xfrm>
-          <a:off x="457200" y="1371600"/>
-          <a:ext cx="8229600" cy="4572000"/>
-        </p:xfrm>
-        <a:graphic>
-          <a:graphicData uri="http://schemas.openxmlformats.org/drawingml/2006/table">
-            <a:tbl>
-              <a:tblPr firstRow="1" bandRow="1">
-                <a:tableStyleId>{5C22544A-7EE6-4342-B048-85BDC9FD1C3A}</a:tableStyleId>
-              </a:tblPr>
-              <a:tblGrid>
-                <a:gridCol w="2743200"/>
-                <a:gridCol w="2743200"/>
-                <a:gridCol w="2743200"/>
-              </a:tblGrid>
-              <a:tr h="762000">
-                <a:tc>
-                  <a:txBody>
-                    <a:bodyPr/>
-                    <a:lstStyle/>
-                    <a:p/>
-                  </a:txBody>
-                  <a:tcPr/>
-                </a:tc>
-                <a:tc>
-                  <a:txBody>
-                    <a:bodyPr/>
-                    <a:lstStyle/>
-                    <a:p>
-                      <a:r>
-                        <a:rPr sz="1000"/>
-                        <a:t>Alternative 1 - Yue Sai for Modern Young Women</a:t>
-                      </a:r>
-                    </a:p>
-                  </a:txBody>
-                  <a:tcPr/>
-                </a:tc>
-                <a:tc>
-                  <a:txBody>
-                    <a:bodyPr/>
-                    <a:lstStyle/>
-                    <a:p>
-                      <a:r>
-                        <a:rPr sz="1000"/>
-                        <a:t>Alternative 2 - Yue Sai For All</a:t>
-                      </a:r>
-                    </a:p>
-                  </a:txBody>
-                  <a:tcPr/>
-                </a:tc>
-              </a:tr>
-              <a:tr h="762000">
-                <a:tc>
-                  <a:txBody>
-                    <a:bodyPr/>
-                    <a:lstStyle/>
-                    <a:p>
-                      <a:r>
-                        <a:rPr sz="1000"/>
-                        <a:t>Target Audience</a:t>
-                      </a:r>
-                    </a:p>
-                  </a:txBody>
-                  <a:tcPr/>
-                </a:tc>
-                <a:tc>
-                  <a:txBody>
-                    <a:bodyPr/>
-                    <a:lstStyle/>
-                    <a:p>
-                      <a:r>
-                        <a:rPr sz="1000"/>
-                        <a:t>18-35 affluent women</a:t>
-                      </a:r>
-                    </a:p>
-                  </a:txBody>
-                  <a:tcPr/>
-                </a:tc>
-                <a:tc>
-                  <a:txBody>
-                    <a:bodyPr/>
-                    <a:lstStyle/>
-                    <a:p>
-                      <a:r>
-                        <a:rPr sz="1000"/>
-                        <a:t>18-59 women and men</a:t>
-                      </a:r>
-                    </a:p>
-                  </a:txBody>
-                  <a:tcPr/>
-                </a:tc>
-              </a:tr>
-              <a:tr h="762000">
-                <a:tc>
-                  <a:txBody>
-                    <a:bodyPr/>
-                    <a:lstStyle/>
-                    <a:p>
-                      <a:r>
-                        <a:rPr sz="1000"/>
-                        <a:t>Positioning</a:t>
-                      </a:r>
-                    </a:p>
-                  </a:txBody>
-                  <a:tcPr/>
-                </a:tc>
-                <a:tc>
-                  <a:txBody>
-                    <a:bodyPr/>
-                    <a:lstStyle/>
-                    <a:p>
-                      <a:r>
-                        <a:rPr sz="1000"/>
-                        <a:t>Luxury</a:t>
-                      </a:r>
-                    </a:p>
-                  </a:txBody>
-                  <a:tcPr/>
-                </a:tc>
-                <a:tc>
-                  <a:txBody>
-                    <a:bodyPr/>
-                    <a:lstStyle/>
-                    <a:p>
-                      <a:r>
-                        <a:rPr sz="1000"/>
-                        <a:t>- Yue Sai (YS) Select - luxury</a:t>
-                      </a:r>
-                    </a:p>
-                    <a:p>
-                      <a:r>
-                        <a:rPr sz="1000"/>
-                        <a:t>- Yue Sai (YS) Essentials - value</a:t>
-                      </a:r>
-                    </a:p>
-                  </a:txBody>
-                  <a:tcPr/>
-                </a:tc>
-              </a:tr>
-              <a:tr h="762000">
-                <a:tc>
-                  <a:txBody>
-                    <a:bodyPr/>
-                    <a:lstStyle/>
-                    <a:p>
-                      <a:r>
-                        <a:rPr sz="1000"/>
-                        <a:t>Messaging</a:t>
-                      </a:r>
-                    </a:p>
-                  </a:txBody>
-                  <a:tcPr/>
-                </a:tc>
-                <a:tc>
-                  <a:txBody>
-                    <a:bodyPr/>
-                    <a:lstStyle/>
-                    <a:p>
-                      <a:r>
-                        <a:rPr sz="1000"/>
-                        <a:t>- Downplay link with L’Oreal (distinctive colors and brand identity)</a:t>
-                      </a:r>
-                    </a:p>
-                    <a:p>
-                      <a:r>
-                        <a:rPr sz="1000"/>
-                        <a:t>- Combining benefits of TCM and modern science for the modern Chinese woman</a:t>
-                      </a:r>
-                    </a:p>
-                    <a:p>
-                      <a:r>
-                        <a:rPr sz="1000"/>
-                        <a:t>- Supermodels / famous actresses as brand ambassadors</a:t>
-                      </a:r>
-                    </a:p>
-                  </a:txBody>
-                  <a:tcPr/>
-                </a:tc>
-                <a:tc>
-                  <a:txBody>
-                    <a:bodyPr/>
-                    <a:lstStyle/>
-                    <a:p>
-                      <a:r>
-                        <a:rPr sz="1000"/>
-                        <a:t>Downplay link with L’Oreal across the board</a:t>
-                      </a:r>
-                    </a:p>
-                    <a:p/>
-                    <a:p>
-                      <a:r>
-                        <a:rPr sz="1000"/>
-                        <a:t>- YS Select - Luxury - Combining benefits of TCM and modern science, supermodels as ambassadors</a:t>
-                      </a:r>
-                    </a:p>
-                    <a:p>
-                      <a:r>
-                        <a:rPr sz="1000"/>
-                        <a:t>- YS Essentials - Value - Benefits of TCM for all, less famous models</a:t>
-                      </a:r>
-                    </a:p>
-                  </a:txBody>
-                  <a:tcPr/>
-                </a:tc>
-              </a:tr>
-              <a:tr h="762000">
-                <a:tc>
-                  <a:txBody>
-                    <a:bodyPr/>
-                    <a:lstStyle/>
-                    <a:p>
-                      <a:r>
-                        <a:rPr sz="1000"/>
-                        <a:t>Product Line(s)</a:t>
-                      </a:r>
-                    </a:p>
-                  </a:txBody>
-                  <a:tcPr/>
-                </a:tc>
-                <a:tc>
-                  <a:txBody>
-                    <a:bodyPr/>
-                    <a:lstStyle/>
-                    <a:p>
-                      <a:r>
-                        <a:rPr sz="1000"/>
-                        <a:t>Skincare</a:t>
-                      </a:r>
-                    </a:p>
-                    <a:p>
-                      <a:r>
-                        <a:rPr sz="1000"/>
-                        <a:t>Premium price points</a:t>
-                      </a:r>
-                    </a:p>
-                  </a:txBody>
-                  <a:tcPr/>
-                </a:tc>
-                <a:tc>
-                  <a:txBody>
-                    <a:bodyPr/>
-                    <a:lstStyle/>
-                    <a:p>
-                      <a:r>
-                        <a:rPr sz="1000"/>
-                        <a:t>Skincare and make-up</a:t>
-                      </a:r>
-                    </a:p>
-                    <a:p>
-                      <a:r>
-                        <a:rPr sz="1000"/>
-                        <a:t>Multiple price points</a:t>
-                      </a:r>
-                    </a:p>
-                  </a:txBody>
-                  <a:tcPr/>
-                </a:tc>
-              </a:tr>
-              <a:tr h="762000">
-                <a:tc>
-                  <a:txBody>
-                    <a:bodyPr/>
-                    <a:lstStyle/>
-                    <a:p>
-                      <a:r>
-                        <a:rPr sz="1000"/>
-                        <a:t>Channels</a:t>
-                      </a:r>
-                    </a:p>
-                  </a:txBody>
-                  <a:tcPr/>
-                </a:tc>
-                <a:tc>
-                  <a:txBody>
-                    <a:bodyPr/>
-                    <a:lstStyle/>
-                    <a:p>
-                      <a:r>
-                        <a:rPr sz="1000"/>
-                        <a:t>- E-commerce</a:t>
-                      </a:r>
-                    </a:p>
-                    <a:p>
-                      <a:r>
-                        <a:rPr sz="1000"/>
-                        <a:t>- Standalone stores in tier - 1 cities</a:t>
-                      </a:r>
-                    </a:p>
-                  </a:txBody>
-                  <a:tcPr/>
-                </a:tc>
-                <a:tc>
-                  <a:txBody>
-                    <a:bodyPr/>
-                    <a:lstStyle/>
-                    <a:p>
-                      <a:r>
-                        <a:rPr sz="1000"/>
-                        <a:t>- YS Select - E-commerce, standalone stores in tier - 1 cities</a:t>
-                      </a:r>
-                    </a:p>
-                    <a:p>
-                      <a:r>
-                        <a:rPr sz="1000"/>
-                        <a:t>- YS Essentials - class - 2 department stores, small local shops</a:t>
-                      </a:r>
-                    </a:p>
-                  </a:txBody>
-                  <a:tcPr/>
-                </a:tc>
-              </a:tr>
-            </a:tbl>
-          </a:graphicData>
-        </a:graphic>
-      </p:graphicFrame>
+        </p:nvSpPr>
+        <p:spPr>
+          <a:xfrm>
+            <a:off x="457200" y="182880"/>
+            <a:ext cx="8229600" cy="914400"/>
+          </a:xfrm>
+          <a:prstGeom prst="rect">
+            <a:avLst/>
+          </a:prstGeom>
+          <a:noFill/>
+        </p:spPr>
+        <p:txBody>
+          <a:bodyPr wrap="none">
+            <a:spAutoFit/>
+          </a:bodyPr>
+          <a:lstStyle/>
+          <a:p>
+            <a:r>
+              <a:t>Nutrition Facts Disclaimer</a:t>
+            </a:r>
+          </a:p>
+        </p:txBody>
+      </p:sp>
+      <p:sp>
+        <p:nvSpPr>
+          <p:cNvPr id="3" name="TextBox 2"/>
+          <p:cNvSpPr txBox="1"/>
+          <p:nvPr/>
+        </p:nvSpPr>
+        <p:spPr>
+          <a:xfrm>
+            <a:off x="5029200" y="1828800"/>
+            <a:ext cx="5486400" cy="2286000"/>
+          </a:xfrm>
+          <a:prstGeom prst="rect">
+            <a:avLst/>
+          </a:prstGeom>
+          <a:noFill/>
+        </p:spPr>
+        <p:txBody>
+          <a:bodyPr wrap="square">
+            <a:noAutofit/>
+          </a:bodyPr>
+          <a:lstStyle/>
+          <a:p>
+            <a:r>
+              <a:rPr sz="1800" b="0" i="0">
+                <a:latin typeface="Calibri"/>
+              </a:rPr>
+              <a:t>Nutrition labels are estimates and may vary based on ingredients used. Visit the website for more information.</a:t>
+            </a:r>
+            <a:endParaRPr sz="1800" b="0" i="0">
+              <a:latin typeface="Calibri"/>
+            </a:endParaRPr>
+          </a:p>
+        </p:txBody>
+      </p:sp>
     </p:spTree>
   </p:cSld>
   <p:clrMapOvr>
@@ -3779,293 +3478,306 @@
       <p:grpSpPr/>
       <p:sp>
         <p:nvSpPr>
-          <p:cNvPr id="2" name="Title 1"/>
-          <p:cNvSpPr>
-            <a:spLocks noGrp="1"/>
-          </p:cNvSpPr>
-          <p:nvPr>
-            <p:ph type="title"/>
-          </p:nvPr>
-        </p:nvSpPr>
-        <p:spPr/>
-        <p:txBody>
-          <a:bodyPr/>
-          <a:lstStyle/>
-          <a:p>
-            <a:r>
-              <a:t>Table 2</a:t>
-            </a:r>
-          </a:p>
-        </p:txBody>
-      </p:sp>
-      <p:graphicFrame>
-        <p:nvGraphicFramePr>
-          <p:cNvPr id="3" name="Table 2"/>
-          <p:cNvGraphicFramePr>
-            <a:graphicFrameLocks noGrp="1"/>
-          </p:cNvGraphicFramePr>
+          <p:cNvPr id="2" name="TextBox 1"/>
+          <p:cNvSpPr txBox="1"/>
           <p:nvPr/>
-        </p:nvGraphicFramePr>
-        <p:xfrm>
-          <a:off x="457200" y="1371600"/>
-          <a:ext cx="8229600" cy="4572000"/>
-        </p:xfrm>
-        <a:graphic>
-          <a:graphicData uri="http://schemas.openxmlformats.org/drawingml/2006/table">
-            <a:tbl>
-              <a:tblPr firstRow="1" bandRow="1">
-                <a:tableStyleId>{5C22544A-7EE6-4342-B048-85BDC9FD1C3A}</a:tableStyleId>
-              </a:tblPr>
-              <a:tblGrid>
-                <a:gridCol w="2743200"/>
-                <a:gridCol w="2743200"/>
-                <a:gridCol w="2743200"/>
-              </a:tblGrid>
-              <a:tr h="762000">
-                <a:tc>
-                  <a:txBody>
-                    <a:bodyPr/>
-                    <a:lstStyle/>
-                    <a:p/>
-                  </a:txBody>
-                  <a:tcPr/>
-                </a:tc>
-                <a:tc>
-                  <a:txBody>
-                    <a:bodyPr/>
-                    <a:lstStyle/>
-                    <a:p>
-                      <a:r>
-                        <a:rPr sz="1000"/>
-                        <a:t>Alternative 1 - Target Modern Young Women</a:t>
-                      </a:r>
-                    </a:p>
-                  </a:txBody>
-                  <a:tcPr/>
-                </a:tc>
-                <a:tc>
-                  <a:txBody>
-                    <a:bodyPr/>
-                    <a:lstStyle/>
-                    <a:p>
-                      <a:r>
-                        <a:rPr sz="1000"/>
-                        <a:t>Alternative 2 - Yue Sai for All</a:t>
-                      </a:r>
-                    </a:p>
-                  </a:txBody>
-                  <a:tcPr/>
-                </a:tc>
-              </a:tr>
-              <a:tr h="762000">
-                <a:tc>
-                  <a:txBody>
-                    <a:bodyPr/>
-                    <a:lstStyle/>
-                    <a:p>
-                      <a:r>
-                        <a:rPr sz="1000"/>
-                        <a:t>Sales</a:t>
-                      </a:r>
-                    </a:p>
-                  </a:txBody>
-                  <a:tcPr/>
-                </a:tc>
-                <a:tc>
-                  <a:txBody>
-                    <a:bodyPr/>
-                    <a:lstStyle/>
-                    <a:p>
-                      <a:r>
-                        <a:rPr sz="1000"/>
-                        <a:t>High Potential of Sales and Profitability via premium skincare, aligned with modern lifestyle aspirations.</a:t>
-                      </a:r>
-                    </a:p>
-                  </a:txBody>
-                  <a:tcPr/>
-                </a:tc>
-                <a:tc>
-                  <a:txBody>
-                    <a:bodyPr/>
-                    <a:lstStyle/>
-                    <a:p>
-                      <a:r>
-                        <a:rPr sz="1000"/>
-                        <a:t>High Potential of Sales and Profitability as broad coverage across segments.</a:t>
-                      </a:r>
-                    </a:p>
-                  </a:txBody>
-                  <a:tcPr/>
-                </a:tc>
-              </a:tr>
-              <a:tr h="762000">
-                <a:tc>
-                  <a:txBody>
-                    <a:bodyPr/>
-                    <a:lstStyle/>
-                    <a:p>
-                      <a:r>
-                        <a:rPr sz="1000"/>
-                        <a:t>Product Market Fit</a:t>
-                      </a:r>
-                    </a:p>
-                  </a:txBody>
-                  <a:tcPr/>
-                </a:tc>
-                <a:tc>
-                  <a:txBody>
-                    <a:bodyPr/>
-                    <a:lstStyle/>
-                    <a:p>
-                      <a:r>
-                        <a:rPr sz="1000"/>
-                        <a:t>Excellent fit with modern, urban women seeking authenticity, TCM benefits, and digitally engaging luxury.</a:t>
-                      </a:r>
-                    </a:p>
-                  </a:txBody>
-                  <a:tcPr/>
-                </a:tc>
-                <a:tc>
-                  <a:txBody>
-                    <a:bodyPr/>
-                    <a:lstStyle/>
-                    <a:p>
-                      <a:r>
-                        <a:rPr sz="1000"/>
-                        <a:t>Moderate fit - covers more segments, but risks brand identity.</a:t>
-                      </a:r>
-                    </a:p>
-                  </a:txBody>
-                  <a:tcPr/>
-                </a:tc>
-              </a:tr>
-              <a:tr h="762000">
-                <a:tc>
-                  <a:txBody>
-                    <a:bodyPr/>
-                    <a:lstStyle/>
-                    <a:p>
-                      <a:r>
-                        <a:rPr sz="1000"/>
-                        <a:t>Strategic Fit</a:t>
-                      </a:r>
-                    </a:p>
-                  </a:txBody>
-                  <a:tcPr/>
-                </a:tc>
-                <a:tc>
-                  <a:txBody>
-                    <a:bodyPr/>
-                    <a:lstStyle/>
-                    <a:p>
-                      <a:r>
-                        <a:rPr sz="1000"/>
-                        <a:t>Strong fit - Reinforces L’Oreal’s luxury strategy with culturally rooted skincare innovation via TCM.</a:t>
-                      </a:r>
-                    </a:p>
-                  </a:txBody>
-                  <a:tcPr/>
-                </a:tc>
-                <a:tc>
-                  <a:txBody>
-                    <a:bodyPr/>
-                    <a:lstStyle/>
-                    <a:p>
-                      <a:r>
-                        <a:rPr sz="1000"/>
-                        <a:t>Fits L’Oreal’s inclusive “beauty for all” vision.</a:t>
-                      </a:r>
-                    </a:p>
-                  </a:txBody>
-                  <a:tcPr/>
-                </a:tc>
-              </a:tr>
-              <a:tr h="762000">
-                <a:tc>
-                  <a:txBody>
-                    <a:bodyPr/>
-                    <a:lstStyle/>
-                    <a:p>
-                      <a:r>
-                        <a:rPr sz="1000"/>
-                        <a:t>Attrition Risk</a:t>
-                      </a:r>
-                    </a:p>
-                  </a:txBody>
-                  <a:tcPr/>
-                </a:tc>
-                <a:tc>
-                  <a:txBody>
-                    <a:bodyPr/>
-                    <a:lstStyle/>
-                    <a:p>
-                      <a:r>
-                        <a:rPr sz="1000"/>
-                        <a:t>Moderate Risk - alienates older loyalists, highly competitive digital space with strong local rivals i.e., Herborist, Chando.</a:t>
-                      </a:r>
-                    </a:p>
-                  </a:txBody>
-                  <a:tcPr/>
-                </a:tc>
-                <a:tc>
-                  <a:txBody>
-                    <a:bodyPr/>
-                    <a:lstStyle/>
-                    <a:p>
-                      <a:r>
-                        <a:rPr sz="1000"/>
-                        <a:t>Low - appeals to a wider demographic; smoother retention path but risks dilution of brand prestige.</a:t>
-                      </a:r>
-                    </a:p>
-                  </a:txBody>
-                  <a:tcPr/>
-                </a:tc>
-              </a:tr>
-              <a:tr h="762000">
-                <a:tc>
-                  <a:txBody>
-                    <a:bodyPr/>
-                    <a:lstStyle/>
-                    <a:p>
-                      <a:r>
-                        <a:rPr sz="1000"/>
-                        <a:t>Execution</a:t>
-                      </a:r>
-                    </a:p>
-                  </a:txBody>
-                  <a:tcPr/>
-                </a:tc>
-                <a:tc>
-                  <a:txBody>
-                    <a:bodyPr/>
-                    <a:lstStyle/>
-                    <a:p>
-                      <a:r>
-                        <a:rPr sz="1000"/>
-                        <a:t>Moderate - Requires focused digital campaigns, TCM R&amp;D and expansion in premium tiers.</a:t>
-                      </a:r>
-                    </a:p>
-                  </a:txBody>
-                  <a:tcPr/>
-                </a:tc>
-                <a:tc>
-                  <a:txBody>
-                    <a:bodyPr/>
-                    <a:lstStyle/>
-                    <a:p>
-                      <a:r>
-                        <a:rPr sz="1000"/>
-                        <a:t>Very High - managing multiple channels increases complexity and cost substantially.</a:t>
-                      </a:r>
-                    </a:p>
-                  </a:txBody>
-                  <a:tcPr/>
-                </a:tc>
-              </a:tr>
-            </a:tbl>
-          </a:graphicData>
-        </a:graphic>
-      </p:graphicFrame>
+        </p:nvSpPr>
+        <p:spPr>
+          <a:xfrm>
+            <a:off x="457200" y="182880"/>
+            <a:ext cx="8229600" cy="914400"/>
+          </a:xfrm>
+          <a:prstGeom prst="rect">
+            <a:avLst/>
+          </a:prstGeom>
+          <a:noFill/>
+        </p:spPr>
+        <p:txBody>
+          <a:bodyPr wrap="none">
+            <a:spAutoFit/>
+          </a:bodyPr>
+          <a:lstStyle/>
+          <a:p>
+            <a:r>
+              <a:t>Fruit Storage and Cooking Tools</a:t>
+            </a:r>
+          </a:p>
+        </p:txBody>
+      </p:sp>
+      <p:sp>
+        <p:nvSpPr>
+          <p:cNvPr id="3" name="TextBox 2"/>
+          <p:cNvSpPr txBox="1"/>
+          <p:nvPr/>
+        </p:nvSpPr>
+        <p:spPr>
+          <a:xfrm>
+            <a:off x="457200" y="1828800"/>
+            <a:ext cx="5486400" cy="2286000"/>
+          </a:xfrm>
+          <a:prstGeom prst="rect">
+            <a:avLst/>
+          </a:prstGeom>
+          <a:noFill/>
+        </p:spPr>
+        <p:txBody>
+          <a:bodyPr wrap="square">
+            <a:noAutofit/>
+          </a:bodyPr>
+          <a:lstStyle/>
+          <a:p>
+            <a:r>
+              <a:rPr sz="1800" b="0" i="0">
+                <a:latin typeface="Calibri"/>
+              </a:rPr>
+              <a:t>Tips on storing and using fruits effectively. List of essential cooking tools.</a:t>
+            </a:r>
+            <a:endParaRPr sz="1800" b="0" i="0">
+              <a:latin typeface="Calibri"/>
+            </a:endParaRPr>
+          </a:p>
+        </p:txBody>
+      </p:sp>
+    </p:spTree>
+  </p:cSld>
+  <p:clrMapOvr>
+    <a:masterClrMapping/>
+  </p:clrMapOvr>
+</p:sld>
+</file>
+
+<file path=ppt/slides/slide7.xml><?xml version="1.0" encoding="utf-8"?>
+<p:sld xmlns:a="http://schemas.openxmlformats.org/drawingml/2006/main" xmlns:p="http://schemas.openxmlformats.org/presentationml/2006/main" xmlns:r="http://schemas.openxmlformats.org/officeDocument/2006/relationships">
+  <p:cSld>
+    <p:spTree>
+      <p:nvGrpSpPr>
+        <p:cNvPr id="1" name=""/>
+        <p:cNvGrpSpPr/>
+        <p:nvPr/>
+      </p:nvGrpSpPr>
+      <p:grpSpPr/>
+      <p:sp>
+        <p:nvSpPr>
+          <p:cNvPr id="2" name="TextBox 1"/>
+          <p:cNvSpPr txBox="1"/>
+          <p:nvPr/>
+        </p:nvSpPr>
+        <p:spPr>
+          <a:xfrm>
+            <a:off x="457200" y="182880"/>
+            <a:ext cx="8229600" cy="914400"/>
+          </a:xfrm>
+          <a:prstGeom prst="rect">
+            <a:avLst/>
+          </a:prstGeom>
+          <a:noFill/>
+        </p:spPr>
+        <p:txBody>
+          <a:bodyPr wrap="none">
+            <a:spAutoFit/>
+          </a:bodyPr>
+          <a:lstStyle/>
+          <a:p>
+            <a:r>
+              <a:t>Apple Spice Oatmeal Recipe</a:t>
+            </a:r>
+          </a:p>
+        </p:txBody>
+      </p:sp>
+      <p:sp>
+        <p:nvSpPr>
+          <p:cNvPr id="3" name="TextBox 2"/>
+          <p:cNvSpPr txBox="1"/>
+          <p:nvPr/>
+        </p:nvSpPr>
+        <p:spPr>
+          <a:xfrm>
+            <a:off x="5029200" y="1828800"/>
+            <a:ext cx="5486400" cy="2286000"/>
+          </a:xfrm>
+          <a:prstGeom prst="rect">
+            <a:avLst/>
+          </a:prstGeom>
+          <a:noFill/>
+        </p:spPr>
+        <p:txBody>
+          <a:bodyPr wrap="square">
+            <a:noAutofit/>
+          </a:bodyPr>
+          <a:lstStyle/>
+          <a:p>
+            <a:r>
+              <a:rPr sz="1800" b="0" i="0">
+                <a:latin typeface="Calibri"/>
+              </a:rPr>
+              <a:t>Instructions for making a delicious apple spice oatmeal dish.</a:t>
+            </a:r>
+            <a:endParaRPr sz="1800" b="0" i="0">
+              <a:latin typeface="Calibri"/>
+            </a:endParaRPr>
+          </a:p>
+        </p:txBody>
+      </p:sp>
+    </p:spTree>
+  </p:cSld>
+  <p:clrMapOvr>
+    <a:masterClrMapping/>
+  </p:clrMapOvr>
+</p:sld>
+</file>
+
+<file path=ppt/slides/slide8.xml><?xml version="1.0" encoding="utf-8"?>
+<p:sld xmlns:a="http://schemas.openxmlformats.org/drawingml/2006/main" xmlns:p="http://schemas.openxmlformats.org/presentationml/2006/main" xmlns:r="http://schemas.openxmlformats.org/officeDocument/2006/relationships">
+  <p:cSld>
+    <p:spTree>
+      <p:nvGrpSpPr>
+        <p:cNvPr id="1" name=""/>
+        <p:cNvGrpSpPr/>
+        <p:nvPr/>
+      </p:nvGrpSpPr>
+      <p:grpSpPr/>
+      <p:sp>
+        <p:nvSpPr>
+          <p:cNvPr id="2" name="TextBox 1"/>
+          <p:cNvSpPr txBox="1"/>
+          <p:nvPr/>
+        </p:nvSpPr>
+        <p:spPr>
+          <a:xfrm>
+            <a:off x="457200" y="182880"/>
+            <a:ext cx="8229600" cy="914400"/>
+          </a:xfrm>
+          <a:prstGeom prst="rect">
+            <a:avLst/>
+          </a:prstGeom>
+          <a:noFill/>
+        </p:spPr>
+        <p:txBody>
+          <a:bodyPr wrap="none">
+            <a:spAutoFit/>
+          </a:bodyPr>
+          <a:lstStyle/>
+          <a:p>
+            <a:r>
+              <a:t>Whole Grains Storage Guide</a:t>
+            </a:r>
+          </a:p>
+        </p:txBody>
+      </p:sp>
+      <p:sp>
+        <p:nvSpPr>
+          <p:cNvPr id="3" name="TextBox 2"/>
+          <p:cNvSpPr txBox="1"/>
+          <p:nvPr/>
+        </p:nvSpPr>
+        <p:spPr>
+          <a:xfrm>
+            <a:off x="457200" y="1828800"/>
+            <a:ext cx="5486400" cy="2286000"/>
+          </a:xfrm>
+          <a:prstGeom prst="rect">
+            <a:avLst/>
+          </a:prstGeom>
+          <a:noFill/>
+        </p:spPr>
+        <p:txBody>
+          <a:bodyPr wrap="square">
+            <a:noAutofit/>
+          </a:bodyPr>
+          <a:lstStyle/>
+          <a:p>
+            <a:r>
+              <a:rPr sz="1800" b="0" i="0">
+                <a:latin typeface="Calibri"/>
+              </a:rPr>
+              <a:t>Proper storage tips for whole grains to maintain freshness.</a:t>
+            </a:r>
+            <a:endParaRPr sz="1800" b="0" i="0">
+              <a:latin typeface="Calibri"/>
+            </a:endParaRPr>
+          </a:p>
+        </p:txBody>
+      </p:sp>
+    </p:spTree>
+  </p:cSld>
+  <p:clrMapOvr>
+    <a:masterClrMapping/>
+  </p:clrMapOvr>
+</p:sld>
+</file>
+
+<file path=ppt/slides/slide9.xml><?xml version="1.0" encoding="utf-8"?>
+<p:sld xmlns:a="http://schemas.openxmlformats.org/drawingml/2006/main" xmlns:p="http://schemas.openxmlformats.org/presentationml/2006/main" xmlns:r="http://schemas.openxmlformats.org/officeDocument/2006/relationships">
+  <p:cSld>
+    <p:spTree>
+      <p:nvGrpSpPr>
+        <p:cNvPr id="1" name=""/>
+        <p:cNvGrpSpPr/>
+        <p:nvPr/>
+      </p:nvGrpSpPr>
+      <p:grpSpPr/>
+      <p:sp>
+        <p:nvSpPr>
+          <p:cNvPr id="2" name="TextBox 1"/>
+          <p:cNvSpPr txBox="1"/>
+          <p:nvPr/>
+        </p:nvSpPr>
+        <p:spPr>
+          <a:xfrm>
+            <a:off x="457200" y="182880"/>
+            <a:ext cx="8229600" cy="914400"/>
+          </a:xfrm>
+          <a:prstGeom prst="rect">
+            <a:avLst/>
+          </a:prstGeom>
+          <a:noFill/>
+        </p:spPr>
+        <p:txBody>
+          <a:bodyPr wrap="none">
+            <a:spAutoFit/>
+          </a:bodyPr>
+          <a:lstStyle/>
+          <a:p>
+            <a:r>
+              <a:t>Any Berry Sauce Recipe</a:t>
+            </a:r>
+          </a:p>
+        </p:txBody>
+      </p:sp>
+      <p:sp>
+        <p:nvSpPr>
+          <p:cNvPr id="3" name="TextBox 2"/>
+          <p:cNvSpPr txBox="1"/>
+          <p:nvPr/>
+        </p:nvSpPr>
+        <p:spPr>
+          <a:xfrm>
+            <a:off x="5029200" y="1828800"/>
+            <a:ext cx="5486400" cy="2286000"/>
+          </a:xfrm>
+          <a:prstGeom prst="rect">
+            <a:avLst/>
+          </a:prstGeom>
+          <a:noFill/>
+        </p:spPr>
+        <p:txBody>
+          <a:bodyPr wrap="square">
+            <a:noAutofit/>
+          </a:bodyPr>
+          <a:lstStyle/>
+          <a:p>
+            <a:r>
+              <a:rPr sz="1800" b="0" i="0">
+                <a:latin typeface="Calibri"/>
+              </a:rPr>
+              <a:t>Simple steps to prepare a tasty berry sauce using fresh or frozen berries.</a:t>
+            </a:r>
+            <a:endParaRPr sz="1800" b="0" i="0">
+              <a:latin typeface="Calibri"/>
+            </a:endParaRPr>
+          </a:p>
+        </p:txBody>
+      </p:sp>
     </p:spTree>
   </p:cSld>
   <p:clrMapOvr>

</xml_diff>